<commit_message>
split up slides into chunks
</commit_message>
<xml_diff>
--- a/ClassMaterials/Encapsulation/Slides/Part1-UML-Code.pptx
+++ b/ClassMaterials/Encapsulation/Slides/Part1-UML-Code.pptx
@@ -223,7 +223,7 @@
           <a:p>
             <a:fld id="{4F942F4A-6994-3A49-9461-EE810FAF072D}" type="datetimeFigureOut">
               <a:rPr lang="en-US" smtClean="0"/>
-              <a:t>11/22/2022</a:t>
+              <a:t>3/19/2023</a:t>
             </a:fld>
             <a:endParaRPr lang="en-US"/>
           </a:p>
@@ -388,7 +388,7 @@
           <a:p>
             <a:fld id="{11374350-B736-4AC1-A1E7-19777DF1B0E1}" type="datetimeFigureOut">
               <a:rPr lang="en-US" smtClean="0"/>
-              <a:t>11/22/2022</a:t>
+              <a:t>3/19/2023</a:t>
             </a:fld>
             <a:endParaRPr lang="en-US"/>
           </a:p>
@@ -2089,7 +2089,7 @@
           <a:p>
             <a:fld id="{50A519B0-864F-436F-AD10-563B5AD2C023}" type="datetimeFigureOut">
               <a:rPr lang="en-US" smtClean="0"/>
-              <a:t>11/22/2022</a:t>
+              <a:t>3/19/2023</a:t>
             </a:fld>
             <a:endParaRPr lang="en-US"/>
           </a:p>
@@ -2257,7 +2257,7 @@
           <a:p>
             <a:fld id="{50A519B0-864F-436F-AD10-563B5AD2C023}" type="datetimeFigureOut">
               <a:rPr lang="en-US" smtClean="0"/>
-              <a:t>11/22/2022</a:t>
+              <a:t>3/19/2023</a:t>
             </a:fld>
             <a:endParaRPr lang="en-US"/>
           </a:p>
@@ -2435,7 +2435,7 @@
           <a:p>
             <a:fld id="{50A519B0-864F-436F-AD10-563B5AD2C023}" type="datetimeFigureOut">
               <a:rPr lang="en-US" smtClean="0"/>
-              <a:t>11/22/2022</a:t>
+              <a:t>3/19/2023</a:t>
             </a:fld>
             <a:endParaRPr lang="en-US"/>
           </a:p>
@@ -2603,7 +2603,7 @@
           <a:p>
             <a:fld id="{50A519B0-864F-436F-AD10-563B5AD2C023}" type="datetimeFigureOut">
               <a:rPr lang="en-US" smtClean="0"/>
-              <a:t>11/22/2022</a:t>
+              <a:t>3/19/2023</a:t>
             </a:fld>
             <a:endParaRPr lang="en-US"/>
           </a:p>
@@ -2848,7 +2848,7 @@
           <a:p>
             <a:fld id="{50A519B0-864F-436F-AD10-563B5AD2C023}" type="datetimeFigureOut">
               <a:rPr lang="en-US" smtClean="0"/>
-              <a:t>11/22/2022</a:t>
+              <a:t>3/19/2023</a:t>
             </a:fld>
             <a:endParaRPr lang="en-US"/>
           </a:p>
@@ -3133,7 +3133,7 @@
           <a:p>
             <a:fld id="{50A519B0-864F-436F-AD10-563B5AD2C023}" type="datetimeFigureOut">
               <a:rPr lang="en-US" smtClean="0"/>
-              <a:t>11/22/2022</a:t>
+              <a:t>3/19/2023</a:t>
             </a:fld>
             <a:endParaRPr lang="en-US"/>
           </a:p>
@@ -3552,7 +3552,7 @@
           <a:p>
             <a:fld id="{50A519B0-864F-436F-AD10-563B5AD2C023}" type="datetimeFigureOut">
               <a:rPr lang="en-US" smtClean="0"/>
-              <a:t>11/22/2022</a:t>
+              <a:t>3/19/2023</a:t>
             </a:fld>
             <a:endParaRPr lang="en-US"/>
           </a:p>
@@ -3669,7 +3669,7 @@
           <a:p>
             <a:fld id="{50A519B0-864F-436F-AD10-563B5AD2C023}" type="datetimeFigureOut">
               <a:rPr lang="en-US" smtClean="0"/>
-              <a:t>11/22/2022</a:t>
+              <a:t>3/19/2023</a:t>
             </a:fld>
             <a:endParaRPr lang="en-US"/>
           </a:p>
@@ -3764,7 +3764,7 @@
           <a:p>
             <a:fld id="{50A519B0-864F-436F-AD10-563B5AD2C023}" type="datetimeFigureOut">
               <a:rPr lang="en-US" smtClean="0"/>
-              <a:t>11/22/2022</a:t>
+              <a:t>3/19/2023</a:t>
             </a:fld>
             <a:endParaRPr lang="en-US"/>
           </a:p>
@@ -4039,7 +4039,7 @@
           <a:p>
             <a:fld id="{50A519B0-864F-436F-AD10-563B5AD2C023}" type="datetimeFigureOut">
               <a:rPr lang="en-US" smtClean="0"/>
-              <a:t>11/22/2022</a:t>
+              <a:t>3/19/2023</a:t>
             </a:fld>
             <a:endParaRPr lang="en-US"/>
           </a:p>
@@ -4291,7 +4291,7 @@
           <a:p>
             <a:fld id="{50A519B0-864F-436F-AD10-563B5AD2C023}" type="datetimeFigureOut">
               <a:rPr lang="en-US" smtClean="0"/>
-              <a:t>11/22/2022</a:t>
+              <a:t>3/19/2023</a:t>
             </a:fld>
             <a:endParaRPr lang="en-US"/>
           </a:p>
@@ -4502,7 +4502,7 @@
           <a:p>
             <a:fld id="{50A519B0-864F-436F-AD10-563B5AD2C023}" type="datetimeFigureOut">
               <a:rPr lang="en-US" smtClean="0"/>
-              <a:t>11/22/2022</a:t>
+              <a:t>3/19/2023</a:t>
             </a:fld>
             <a:endParaRPr lang="en-US"/>
           </a:p>
@@ -5006,13 +5006,18 @@
           </a:p>
           <a:p>
             <a:r>
-              <a:rPr lang="en-US" sz="4400" dirty="0">
+              <a:rPr lang="en-US" sz="4400" dirty="0" err="1">
                 <a:highlight>
                   <a:srgbClr val="FFFF00"/>
                 </a:highlight>
               </a:rPr>
-              <a:t>__________</a:t>
-            </a:r>
+              <a:t>onejob</a:t>
+            </a:r>
+            <a:endParaRPr lang="en-US" sz="4400" dirty="0">
+              <a:highlight>
+                <a:srgbClr val="FFFF00"/>
+              </a:highlight>
+            </a:endParaRPr>
           </a:p>
         </p:txBody>
       </p:sp>
@@ -9382,21 +9387,6 @@
 </file>
 
 <file path=customXml/item1.xml><?xml version="1.0" encoding="utf-8"?>
-<?mso-contentType ?>
-<FormTemplates xmlns="http://schemas.microsoft.com/sharepoint/v3/contenttype/forms">
-  <Display>DocumentLibraryForm</Display>
-  <Edit>DocumentLibraryForm</Edit>
-  <New>DocumentLibraryForm</New>
-</FormTemplates>
-</file>
-
-<file path=customXml/item2.xml><?xml version="1.0" encoding="utf-8"?>
-<p:properties xmlns:p="http://schemas.microsoft.com/office/2006/metadata/properties" xmlns:xsi="http://www.w3.org/2001/XMLSchema-instance" xmlns:pc="http://schemas.microsoft.com/office/infopath/2007/PartnerControls">
-  <documentManagement/>
-</p:properties>
-</file>
-
-<file path=customXml/item3.xml><?xml version="1.0" encoding="utf-8"?>
 <ct:contentTypeSchema xmlns:ct="http://schemas.microsoft.com/office/2006/metadata/contentType" xmlns:ma="http://schemas.microsoft.com/office/2006/metadata/properties/metaAttributes" ct:_="" ma:_="" ma:contentTypeName="Document" ma:contentTypeID="0x0101001570BCAAD2E4294F9443DCB038A55380" ma:contentTypeVersion="8" ma:contentTypeDescription="Create a new document." ma:contentTypeScope="" ma:versionID="9523c79d6bab9e2ad858b5223ec5ed94">
   <xsd:schema xmlns:xsd="http://www.w3.org/2001/XMLSchema" xmlns:xs="http://www.w3.org/2001/XMLSchema" xmlns:p="http://schemas.microsoft.com/office/2006/metadata/properties" xmlns:ns2="201674f6-2bdd-4f13-ba1e-424e4aa70473" targetNamespace="http://schemas.microsoft.com/office/2006/metadata/properties" ma:root="true" ma:fieldsID="587afc94f70b507ec5be5f4d78229b0b" ns2:_="">
     <xsd:import namespace="201674f6-2bdd-4f13-ba1e-424e4aa70473"/>
@@ -9566,24 +9556,22 @@
 </ct:contentTypeSchema>
 </file>
 
-<file path=customXml/itemProps1.xml><?xml version="1.0" encoding="utf-8"?>
-<ds:datastoreItem xmlns:ds="http://schemas.openxmlformats.org/officeDocument/2006/customXml" ds:itemID="{19D63386-58C0-4AE8-8250-8035951A896A}">
-  <ds:schemaRefs>
-    <ds:schemaRef ds:uri="http://schemas.microsoft.com/sharepoint/v3/contenttype/forms"/>
-  </ds:schemaRefs>
-</ds:datastoreItem>
+<file path=customXml/item2.xml><?xml version="1.0" encoding="utf-8"?>
+<p:properties xmlns:p="http://schemas.microsoft.com/office/2006/metadata/properties" xmlns:xsi="http://www.w3.org/2001/XMLSchema-instance" xmlns:pc="http://schemas.microsoft.com/office/infopath/2007/PartnerControls">
+  <documentManagement/>
+</p:properties>
 </file>
 
-<file path=customXml/itemProps2.xml><?xml version="1.0" encoding="utf-8"?>
-<ds:datastoreItem xmlns:ds="http://schemas.openxmlformats.org/officeDocument/2006/customXml" ds:itemID="{B491038B-BF0E-4A77-87DF-C49EC76AAFA7}">
-  <ds:schemaRefs>
-    <ds:schemaRef ds:uri="http://schemas.microsoft.com/office/2006/metadata/properties"/>
-    <ds:schemaRef ds:uri="http://schemas.microsoft.com/office/infopath/2007/PartnerControls"/>
-  </ds:schemaRefs>
-</ds:datastoreItem>
+<file path=customXml/item3.xml><?xml version="1.0" encoding="utf-8"?>
+<?mso-contentType ?>
+<FormTemplates xmlns="http://schemas.microsoft.com/sharepoint/v3/contenttype/forms">
+  <Display>DocumentLibraryForm</Display>
+  <Edit>DocumentLibraryForm</Edit>
+  <New>DocumentLibraryForm</New>
+</FormTemplates>
 </file>
 
-<file path=customXml/itemProps3.xml><?xml version="1.0" encoding="utf-8"?>
+<file path=customXml/itemProps1.xml><?xml version="1.0" encoding="utf-8"?>
 <ds:datastoreItem xmlns:ds="http://schemas.openxmlformats.org/officeDocument/2006/customXml" ds:itemID="{7F299FFE-3069-4F75-8FB8-7719DBB46517}">
   <ds:schemaRefs>
     <ds:schemaRef ds:uri="http://schemas.microsoft.com/office/2006/metadata/contentType"/>
@@ -9599,4 +9587,21 @@
     <ds:schemaRef ds:uri="http://schemas.microsoft.com/internal/obd"/>
   </ds:schemaRefs>
 </ds:datastoreItem>
+</file>
+
+<file path=customXml/itemProps2.xml><?xml version="1.0" encoding="utf-8"?>
+<ds:datastoreItem xmlns:ds="http://schemas.openxmlformats.org/officeDocument/2006/customXml" ds:itemID="{B491038B-BF0E-4A77-87DF-C49EC76AAFA7}">
+  <ds:schemaRefs>
+    <ds:schemaRef ds:uri="http://schemas.microsoft.com/office/2006/metadata/properties"/>
+    <ds:schemaRef ds:uri="http://schemas.microsoft.com/office/infopath/2007/PartnerControls"/>
+  </ds:schemaRefs>
+</ds:datastoreItem>
+</file>
+
+<file path=customXml/itemProps3.xml><?xml version="1.0" encoding="utf-8"?>
+<ds:datastoreItem xmlns:ds="http://schemas.openxmlformats.org/officeDocument/2006/customXml" ds:itemID="{19D63386-58C0-4AE8-8250-8035951A896A}">
+  <ds:schemaRefs>
+    <ds:schemaRef ds:uri="http://schemas.microsoft.com/sharepoint/v3/contenttype/forms"/>
+  </ds:schemaRefs>
+</ds:datastoreItem>
 </file>
</xml_diff>